<commit_message>
jj:poster Added PIMRC poster
</commit_message>
<xml_diff>
--- a/ELIOT_poster.pptx
+++ b/ELIOT_poster.pptx
@@ -5030,7 +5030,7 @@
         </p:nvSpPr>
         <p:spPr bwMode="auto">
           <a:xfrm>
-            <a:off x="7071002" y="36163332"/>
+            <a:off x="6973490" y="36220836"/>
             <a:ext cx="12360230" cy="562413"/>
           </a:xfrm>
           <a:prstGeom prst="rect">
@@ -5269,10 +5269,10 @@
         </p:nvGrpSpPr>
         <p:grpSpPr>
           <a:xfrm>
-            <a:off x="2952550" y="11520157"/>
-            <a:ext cx="6853581" cy="3179983"/>
-            <a:chOff x="2940048" y="11283773"/>
-            <a:chExt cx="6853581" cy="3179983"/>
+            <a:off x="2952550" y="11570035"/>
+            <a:ext cx="6853581" cy="3130105"/>
+            <a:chOff x="2940048" y="11333651"/>
+            <a:chExt cx="6853581" cy="3130105"/>
           </a:xfrm>
         </p:grpSpPr>
         <p:pic>
@@ -5291,7 +5291,7 @@
           </p:blipFill>
           <p:spPr>
             <a:xfrm>
-              <a:off x="5875195" y="11283773"/>
+              <a:off x="5578887" y="11333651"/>
               <a:ext cx="2156620" cy="1435133"/>
             </a:xfrm>
             <a:prstGeom prst="rect">
@@ -5363,7 +5363,7 @@
           </p:blipFill>
           <p:spPr>
             <a:xfrm>
-              <a:off x="3921506" y="11332913"/>
+              <a:off x="3685390" y="11367067"/>
               <a:ext cx="1561747" cy="1447800"/>
             </a:xfrm>
             <a:prstGeom prst="rect">
@@ -5411,7 +5411,7 @@
           </p:blipFill>
           <p:spPr>
             <a:xfrm>
-              <a:off x="8423757" y="11463029"/>
+              <a:off x="8250747" y="11442171"/>
               <a:ext cx="1123400" cy="1255877"/>
             </a:xfrm>
             <a:prstGeom prst="rect">
@@ -5883,7 +5883,7 @@
         </p:nvSpPr>
         <p:spPr bwMode="auto">
           <a:xfrm>
-            <a:off x="13537680" y="29512360"/>
+            <a:off x="13537680" y="29091243"/>
             <a:ext cx="10072810" cy="824023"/>
           </a:xfrm>
           <a:prstGeom prst="rect">
@@ -5934,8 +5934,8 @@
         </p:nvSpPr>
         <p:spPr bwMode="auto">
           <a:xfrm>
-            <a:off x="13730356" y="8774615"/>
-            <a:ext cx="9856787" cy="3086181"/>
+            <a:off x="13723938" y="8692818"/>
+            <a:ext cx="9856787" cy="2655294"/>
           </a:xfrm>
           <a:prstGeom prst="rect">
             <a:avLst/>
@@ -6001,7 +6001,29 @@
                   </a:schemeClr>
                 </a:solidFill>
               </a:rPr>
-              <a:t>a set of requirements for the public lighting </a:t>
+              <a:t>a set of requirements for the </a:t>
+            </a:r>
+            <a:r>
+              <a:rPr lang="en-US" sz="2800" i="1" dirty="0">
+                <a:solidFill>
+                  <a:schemeClr val="tx1">
+                    <a:lumMod val="75000"/>
+                    <a:lumOff val="25000"/>
+                  </a:schemeClr>
+                </a:solidFill>
+              </a:rPr>
+              <a:t>public lighting </a:t>
+            </a:r>
+            <a:r>
+              <a:rPr lang="en-US" sz="2800" i="1" dirty="0" smtClean="0">
+                <a:solidFill>
+                  <a:schemeClr val="tx1">
+                    <a:lumMod val="75000"/>
+                    <a:lumOff val="25000"/>
+                  </a:schemeClr>
+                </a:solidFill>
+              </a:rPr>
+              <a:t>scenario</a:t>
             </a:r>
             <a:r>
               <a:rPr lang="en-US" sz="2800" dirty="0" smtClean="0">
@@ -6012,7 +6034,7 @@
                   </a:schemeClr>
                 </a:solidFill>
               </a:rPr>
-              <a:t>scenario. Based on it </a:t>
+              <a:t>. Based on it </a:t>
             </a:r>
             <a:r>
               <a:rPr lang="en-US" sz="2800" dirty="0" err="1" smtClean="0">
@@ -6034,18 +6056,7 @@
                   </a:schemeClr>
                 </a:solidFill>
               </a:rPr>
-              <a:t> reproduces an </a:t>
-            </a:r>
-            <a:r>
-              <a:rPr lang="en-US" sz="2800" dirty="0" err="1">
-                <a:solidFill>
-                  <a:schemeClr val="tx1">
-                    <a:lumMod val="75000"/>
-                    <a:lumOff val="25000"/>
-                  </a:schemeClr>
-                </a:solidFill>
-              </a:rPr>
-              <a:t>IoT</a:t>
+              <a:t> reproduces the scenario by emulating lighting </a:t>
             </a:r>
             <a:r>
               <a:rPr lang="en-US" sz="2800" dirty="0">
@@ -6056,51 +6067,7 @@
                   </a:schemeClr>
                 </a:solidFill>
               </a:rPr>
-              <a:t> use case referred as </a:t>
-            </a:r>
-            <a:r>
-              <a:rPr lang="en-US" sz="2800" i="1" dirty="0">
-                <a:solidFill>
-                  <a:schemeClr val="tx1">
-                    <a:lumMod val="75000"/>
-                    <a:lumOff val="25000"/>
-                  </a:schemeClr>
-                </a:solidFill>
-              </a:rPr>
-              <a:t>public lighting </a:t>
-            </a:r>
-            <a:r>
-              <a:rPr lang="en-US" sz="2800" i="1" dirty="0" smtClean="0">
-                <a:solidFill>
-                  <a:schemeClr val="tx1">
-                    <a:lumMod val="75000"/>
-                    <a:lumOff val="25000"/>
-                  </a:schemeClr>
-                </a:solidFill>
-              </a:rPr>
-              <a:t>scenario</a:t>
-            </a:r>
-            <a:r>
-              <a:rPr lang="en-US" sz="2800" dirty="0" smtClean="0">
-                <a:solidFill>
-                  <a:schemeClr val="tx1">
-                    <a:lumMod val="75000"/>
-                    <a:lumOff val="25000"/>
-                  </a:schemeClr>
-                </a:solidFill>
-              </a:rPr>
-              <a:t>. The </a:t>
-            </a:r>
-            <a:r>
-              <a:rPr lang="en-US" sz="2800" dirty="0">
-                <a:solidFill>
-                  <a:schemeClr val="tx1">
-                    <a:lumMod val="75000"/>
-                    <a:lumOff val="25000"/>
-                  </a:schemeClr>
-                </a:solidFill>
-              </a:rPr>
-              <a:t>system emulates lighting points and a control cabinet. </a:t>
+              <a:t>points and a control cabinet. </a:t>
             </a:r>
             <a:r>
               <a:rPr lang="en-US" sz="2800" dirty="0" smtClean="0">
@@ -6146,7 +6113,7 @@
         </p:blipFill>
         <p:spPr>
           <a:xfrm>
-            <a:off x="13474921" y="12208145"/>
+            <a:off x="13444133" y="11875745"/>
             <a:ext cx="6033375" cy="3683359"/>
           </a:xfrm>
           <a:prstGeom prst="rect">
@@ -6176,7 +6143,7 @@
         </p:blipFill>
         <p:spPr>
           <a:xfrm>
-            <a:off x="17862051" y="16161489"/>
+            <a:off x="17784644" y="15972685"/>
             <a:ext cx="6302672" cy="3706449"/>
           </a:xfrm>
           <a:prstGeom prst="rect">
@@ -6194,7 +6161,7 @@
         </p:nvSpPr>
         <p:spPr bwMode="auto">
           <a:xfrm>
-            <a:off x="19722625" y="12871706"/>
+            <a:off x="19691837" y="12539306"/>
             <a:ext cx="4183554" cy="2224407"/>
           </a:xfrm>
           <a:prstGeom prst="rect">
@@ -6269,7 +6236,7 @@
         </p:nvSpPr>
         <p:spPr bwMode="auto">
           <a:xfrm>
-            <a:off x="13831611" y="16993957"/>
+            <a:off x="13754204" y="16805153"/>
             <a:ext cx="4183554" cy="1793519"/>
           </a:xfrm>
           <a:prstGeom prst="rect">
@@ -6380,7 +6347,7 @@
         </p:blipFill>
         <p:spPr>
           <a:xfrm>
-            <a:off x="13730356" y="19770097"/>
+            <a:off x="13730356" y="19876012"/>
             <a:ext cx="5777940" cy="3454030"/>
           </a:xfrm>
           <a:prstGeom prst="rect">
@@ -6398,7 +6365,7 @@
         </p:nvSpPr>
         <p:spPr bwMode="auto">
           <a:xfrm>
-            <a:off x="19722625" y="20431510"/>
+            <a:off x="19722625" y="20537425"/>
             <a:ext cx="4183554" cy="2224407"/>
           </a:xfrm>
           <a:prstGeom prst="rect">
@@ -6462,7 +6429,7 @@
         </p:nvSpPr>
         <p:spPr bwMode="auto">
           <a:xfrm>
-            <a:off x="13753703" y="24430440"/>
+            <a:off x="13753703" y="24338126"/>
             <a:ext cx="9856787" cy="4378843"/>
           </a:xfrm>
           <a:prstGeom prst="rect">
@@ -6970,7 +6937,7 @@
         </p:nvSpPr>
         <p:spPr bwMode="auto">
           <a:xfrm>
-            <a:off x="13537680" y="7889369"/>
+            <a:off x="13537680" y="7862804"/>
             <a:ext cx="10072810" cy="824023"/>
           </a:xfrm>
           <a:prstGeom prst="rect">
@@ -7021,8 +6988,8 @@
         </p:nvSpPr>
         <p:spPr bwMode="auto">
           <a:xfrm>
-            <a:off x="13753703" y="30064374"/>
-            <a:ext cx="9856787" cy="2224407"/>
+            <a:off x="13753703" y="29725245"/>
+            <a:ext cx="9856787" cy="2655294"/>
           </a:xfrm>
           <a:prstGeom prst="rect">
             <a:avLst/>
@@ -7054,6 +7021,17 @@
           <a:p>
             <a:pPr algn="just"/>
             <a:r>
+              <a:rPr lang="en-US" sz="2800" dirty="0" err="1" smtClean="0">
+                <a:solidFill>
+                  <a:schemeClr val="tx1">
+                    <a:lumMod val="75000"/>
+                    <a:lumOff val="25000"/>
+                  </a:schemeClr>
+                </a:solidFill>
+              </a:rPr>
+              <a:t>ELIoT</a:t>
+            </a:r>
+            <a:r>
               <a:rPr lang="en-US" sz="2800" dirty="0" smtClean="0">
                 <a:solidFill>
                   <a:schemeClr val="tx1">
@@ -7062,7 +7040,7 @@
                   </a:schemeClr>
                 </a:solidFill>
               </a:rPr>
-              <a:t>This work has already proven valuable to identify design issues with the LWM2M protocol itself, namely on the registration and discovery interfaces as well as the limitations of the object model it uses.</a:t>
+              <a:t> has already proven valuable to identify design issues with the LWM2M protocol itself, namely on the registration and discovery interfaces as well as the limitations of the object model it uses. New scenarios can be added with relative ease and scalability tests can be augmented.</a:t>
             </a:r>
             <a:endParaRPr lang="en-US" sz="2800" dirty="0">
               <a:solidFill>

</xml_diff>